<commit_message>
Bench Shield Ladder Program upload.
</commit_message>
<xml_diff>
--- a/Arduino_UNO/Document/Arduino_UNO_OpenPLC_test_Bench_shield.pptx
+++ b/Arduino_UNO/Document/Arduino_UNO_OpenPLC_test_Bench_shield.pptx
@@ -263,7 +263,7 @@
           <a:p>
             <a:fld id="{D78BB270-217E-4582-8686-84909A824CF5}" type="datetimeFigureOut">
               <a:rPr kumimoji="1" lang="ja-JP" altLang="en-US" smtClean="0"/>
-              <a:t>2022/12/29</a:t>
+              <a:t>2023/1/15</a:t>
             </a:fld>
             <a:endParaRPr kumimoji="1" lang="ja-JP" altLang="en-US"/>
           </a:p>
@@ -493,7 +493,7 @@
           <a:p>
             <a:fld id="{D78BB270-217E-4582-8686-84909A824CF5}" type="datetimeFigureOut">
               <a:rPr kumimoji="1" lang="ja-JP" altLang="en-US" smtClean="0"/>
-              <a:t>2022/12/29</a:t>
+              <a:t>2023/1/15</a:t>
             </a:fld>
             <a:endParaRPr kumimoji="1" lang="ja-JP" altLang="en-US"/>
           </a:p>
@@ -733,7 +733,7 @@
           <a:p>
             <a:fld id="{D78BB270-217E-4582-8686-84909A824CF5}" type="datetimeFigureOut">
               <a:rPr kumimoji="1" lang="ja-JP" altLang="en-US" smtClean="0"/>
-              <a:t>2022/12/29</a:t>
+              <a:t>2023/1/15</a:t>
             </a:fld>
             <a:endParaRPr kumimoji="1" lang="ja-JP" altLang="en-US"/>
           </a:p>
@@ -963,7 +963,7 @@
           <a:p>
             <a:fld id="{D78BB270-217E-4582-8686-84909A824CF5}" type="datetimeFigureOut">
               <a:rPr kumimoji="1" lang="ja-JP" altLang="en-US" smtClean="0"/>
-              <a:t>2022/12/29</a:t>
+              <a:t>2023/1/15</a:t>
             </a:fld>
             <a:endParaRPr kumimoji="1" lang="ja-JP" altLang="en-US"/>
           </a:p>
@@ -1238,7 +1238,7 @@
           <a:p>
             <a:fld id="{D78BB270-217E-4582-8686-84909A824CF5}" type="datetimeFigureOut">
               <a:rPr kumimoji="1" lang="ja-JP" altLang="en-US" smtClean="0"/>
-              <a:t>2022/12/29</a:t>
+              <a:t>2023/1/15</a:t>
             </a:fld>
             <a:endParaRPr kumimoji="1" lang="ja-JP" altLang="en-US"/>
           </a:p>
@@ -1567,7 +1567,7 @@
           <a:p>
             <a:fld id="{D78BB270-217E-4582-8686-84909A824CF5}" type="datetimeFigureOut">
               <a:rPr kumimoji="1" lang="ja-JP" altLang="en-US" smtClean="0"/>
-              <a:t>2022/12/29</a:t>
+              <a:t>2023/1/15</a:t>
             </a:fld>
             <a:endParaRPr kumimoji="1" lang="ja-JP" altLang="en-US"/>
           </a:p>
@@ -2043,7 +2043,7 @@
           <a:p>
             <a:fld id="{D78BB270-217E-4582-8686-84909A824CF5}" type="datetimeFigureOut">
               <a:rPr kumimoji="1" lang="ja-JP" altLang="en-US" smtClean="0"/>
-              <a:t>2022/12/29</a:t>
+              <a:t>2023/1/15</a:t>
             </a:fld>
             <a:endParaRPr kumimoji="1" lang="ja-JP" altLang="en-US"/>
           </a:p>
@@ -2184,7 +2184,7 @@
           <a:p>
             <a:fld id="{D78BB270-217E-4582-8686-84909A824CF5}" type="datetimeFigureOut">
               <a:rPr kumimoji="1" lang="ja-JP" altLang="en-US" smtClean="0"/>
-              <a:t>2022/12/29</a:t>
+              <a:t>2023/1/15</a:t>
             </a:fld>
             <a:endParaRPr kumimoji="1" lang="ja-JP" altLang="en-US"/>
           </a:p>
@@ -2297,7 +2297,7 @@
           <a:p>
             <a:fld id="{D78BB270-217E-4582-8686-84909A824CF5}" type="datetimeFigureOut">
               <a:rPr kumimoji="1" lang="ja-JP" altLang="en-US" smtClean="0"/>
-              <a:t>2022/12/29</a:t>
+              <a:t>2023/1/15</a:t>
             </a:fld>
             <a:endParaRPr kumimoji="1" lang="ja-JP" altLang="en-US"/>
           </a:p>
@@ -2640,7 +2640,7 @@
           <a:p>
             <a:fld id="{D78BB270-217E-4582-8686-84909A824CF5}" type="datetimeFigureOut">
               <a:rPr kumimoji="1" lang="ja-JP" altLang="en-US" smtClean="0"/>
-              <a:t>2022/12/29</a:t>
+              <a:t>2023/1/15</a:t>
             </a:fld>
             <a:endParaRPr kumimoji="1" lang="ja-JP" altLang="en-US"/>
           </a:p>
@@ -2928,7 +2928,7 @@
           <a:p>
             <a:fld id="{D78BB270-217E-4582-8686-84909A824CF5}" type="datetimeFigureOut">
               <a:rPr kumimoji="1" lang="ja-JP" altLang="en-US" smtClean="0"/>
-              <a:t>2022/12/29</a:t>
+              <a:t>2023/1/15</a:t>
             </a:fld>
             <a:endParaRPr kumimoji="1" lang="ja-JP" altLang="en-US"/>
           </a:p>
@@ -3201,7 +3201,7 @@
           <a:p>
             <a:fld id="{D78BB270-217E-4582-8686-84909A824CF5}" type="datetimeFigureOut">
               <a:rPr kumimoji="1" lang="ja-JP" altLang="en-US" smtClean="0"/>
-              <a:t>2022/12/29</a:t>
+              <a:t>2023/1/15</a:t>
             </a:fld>
             <a:endParaRPr kumimoji="1" lang="ja-JP" altLang="en-US"/>
           </a:p>
@@ -3988,7 +3988,7 @@
           <p:nvPr>
             <p:extLst>
               <p:ext uri="{D42A27DB-BD31-4B8C-83A1-F6EECF244321}">
-                <p14:modId xmlns:p14="http://schemas.microsoft.com/office/powerpoint/2010/main" val="1143596624"/>
+                <p14:modId xmlns:p14="http://schemas.microsoft.com/office/powerpoint/2010/main" val="2301054635"/>
               </p:ext>
             </p:extLst>
           </p:nvPr>
@@ -4115,7 +4115,7 @@
                           <a:latin typeface="メイリオ" panose="020B0604030504040204" pitchFamily="50" charset="-128"/>
                           <a:ea typeface="メイリオ" panose="020B0604030504040204" pitchFamily="50" charset="-128"/>
                         </a:rPr>
-                        <a:t>%IX100.0</a:t>
+                        <a:t>%IX0.0</a:t>
                       </a:r>
                       <a:endParaRPr kumimoji="1" lang="ja-JP" altLang="en-US" sz="1400" dirty="0">
                         <a:latin typeface="メイリオ" panose="020B0604030504040204" pitchFamily="50" charset="-128"/>
@@ -4164,7 +4164,7 @@
                           <a:latin typeface="メイリオ" panose="020B0604030504040204" pitchFamily="50" charset="-128"/>
                           <a:ea typeface="メイリオ" panose="020B0604030504040204" pitchFamily="50" charset="-128"/>
                         </a:rPr>
-                        <a:t>%IX100.1</a:t>
+                        <a:t>%IX0.1</a:t>
                       </a:r>
                       <a:endParaRPr kumimoji="1" lang="ja-JP" altLang="en-US" sz="1400" dirty="0">
                         <a:latin typeface="メイリオ" panose="020B0604030504040204" pitchFamily="50" charset="-128"/>
@@ -4213,7 +4213,7 @@
                           <a:latin typeface="メイリオ" panose="020B0604030504040204" pitchFamily="50" charset="-128"/>
                           <a:ea typeface="メイリオ" panose="020B0604030504040204" pitchFamily="50" charset="-128"/>
                         </a:rPr>
-                        <a:t>%IX100.2</a:t>
+                        <a:t>%IX0.2</a:t>
                       </a:r>
                       <a:endParaRPr kumimoji="1" lang="ja-JP" altLang="en-US" sz="1400" dirty="0">
                         <a:latin typeface="メイリオ" panose="020B0604030504040204" pitchFamily="50" charset="-128"/>
@@ -4262,7 +4262,7 @@
                           <a:latin typeface="メイリオ" panose="020B0604030504040204" pitchFamily="50" charset="-128"/>
                           <a:ea typeface="メイリオ" panose="020B0604030504040204" pitchFamily="50" charset="-128"/>
                         </a:rPr>
-                        <a:t>%IX100.3</a:t>
+                        <a:t>%IX0.3</a:t>
                       </a:r>
                       <a:endParaRPr kumimoji="1" lang="ja-JP" altLang="en-US" sz="1400" dirty="0">
                         <a:latin typeface="メイリオ" panose="020B0604030504040204" pitchFamily="50" charset="-128"/>
@@ -4311,7 +4311,7 @@
                           <a:latin typeface="メイリオ" panose="020B0604030504040204" pitchFamily="50" charset="-128"/>
                           <a:ea typeface="メイリオ" panose="020B0604030504040204" pitchFamily="50" charset="-128"/>
                         </a:rPr>
-                        <a:t>%IX100.4</a:t>
+                        <a:t>%IX0.4</a:t>
                       </a:r>
                       <a:endParaRPr kumimoji="1" lang="ja-JP" altLang="en-US" sz="1400" dirty="0">
                         <a:latin typeface="メイリオ" panose="020B0604030504040204" pitchFamily="50" charset="-128"/>
@@ -4346,7 +4346,7 @@
           <p:nvPr>
             <p:extLst>
               <p:ext uri="{D42A27DB-BD31-4B8C-83A1-F6EECF244321}">
-                <p14:modId xmlns:p14="http://schemas.microsoft.com/office/powerpoint/2010/main" val="3058115471"/>
+                <p14:modId xmlns:p14="http://schemas.microsoft.com/office/powerpoint/2010/main" val="3599924238"/>
               </p:ext>
             </p:extLst>
           </p:nvPr>
@@ -4473,7 +4473,7 @@
                           <a:latin typeface="メイリオ" panose="020B0604030504040204" pitchFamily="50" charset="-128"/>
                           <a:ea typeface="メイリオ" panose="020B0604030504040204" pitchFamily="50" charset="-128"/>
                         </a:rPr>
-                        <a:t>%QX100.0</a:t>
+                        <a:t>%QX0.0</a:t>
                       </a:r>
                       <a:endParaRPr kumimoji="1" lang="ja-JP" altLang="en-US" sz="1400" dirty="0">
                         <a:latin typeface="メイリオ" panose="020B0604030504040204" pitchFamily="50" charset="-128"/>
@@ -4522,7 +4522,7 @@
                           <a:latin typeface="メイリオ" panose="020B0604030504040204" pitchFamily="50" charset="-128"/>
                           <a:ea typeface="メイリオ" panose="020B0604030504040204" pitchFamily="50" charset="-128"/>
                         </a:rPr>
-                        <a:t>%QX100.1</a:t>
+                        <a:t>%QX0.1</a:t>
                       </a:r>
                       <a:endParaRPr kumimoji="1" lang="ja-JP" altLang="en-US" sz="1400" dirty="0">
                         <a:latin typeface="メイリオ" panose="020B0604030504040204" pitchFamily="50" charset="-128"/>
@@ -4571,7 +4571,7 @@
                           <a:latin typeface="メイリオ" panose="020B0604030504040204" pitchFamily="50" charset="-128"/>
                           <a:ea typeface="メイリオ" panose="020B0604030504040204" pitchFamily="50" charset="-128"/>
                         </a:rPr>
-                        <a:t>%QX100.2</a:t>
+                        <a:t>%QX0.2</a:t>
                       </a:r>
                       <a:endParaRPr kumimoji="1" lang="ja-JP" altLang="en-US" sz="1400" dirty="0">
                         <a:latin typeface="メイリオ" panose="020B0604030504040204" pitchFamily="50" charset="-128"/>
@@ -4620,7 +4620,7 @@
                           <a:latin typeface="メイリオ" panose="020B0604030504040204" pitchFamily="50" charset="-128"/>
                           <a:ea typeface="メイリオ" panose="020B0604030504040204" pitchFamily="50" charset="-128"/>
                         </a:rPr>
-                        <a:t>%QX100.3</a:t>
+                        <a:t>%QX0.3</a:t>
                       </a:r>
                       <a:endParaRPr kumimoji="1" lang="ja-JP" altLang="en-US" sz="1400" dirty="0">
                         <a:latin typeface="メイリオ" panose="020B0604030504040204" pitchFamily="50" charset="-128"/>

</xml_diff>